<commit_message>
Started with outliert tool section
</commit_message>
<xml_diff>
--- a/eealocatorplots.pptx
+++ b/eealocatorplots.pptx
@@ -195,7 +195,7 @@
           <a:p>
             <a:fld id="{ECF0582C-75C0-4BDC-93C0-2D521776F96B}" type="datetimeFigureOut">
               <a:rPr lang="en-GB" smtClean="0"/>
-              <a:t>21/03/2015</a:t>
+              <a:t>29/03/2015</a:t>
             </a:fld>
             <a:endParaRPr lang="en-GB"/>
           </a:p>
@@ -3765,11 +3765,34 @@
             <p:ph idx="1"/>
           </p:nvPr>
         </p:nvSpPr>
-        <p:spPr/>
+        <p:spPr>
+          <a:xfrm>
+            <a:off x="636588" y="1452563"/>
+            <a:ext cx="7870825" cy="615553"/>
+          </a:xfrm>
+        </p:spPr>
         <p:txBody>
           <a:bodyPr/>
           <a:lstStyle/>
           <a:p>
+            <a:r>
+              <a:rPr lang="en-US" dirty="0" smtClean="0"/>
+              <a:t>See Readme.txt file and </a:t>
+            </a:r>
+            <a:r>
+              <a:rPr lang="en-US" dirty="0" err="1" smtClean="0"/>
+              <a:t>scrips</a:t>
+            </a:r>
+            <a:r>
+              <a:rPr lang="en-US" dirty="0" smtClean="0"/>
+              <a:t>.</a:t>
+            </a:r>
+          </a:p>
+          <a:p>
+            <a:r>
+              <a:rPr lang="en-US" dirty="0" smtClean="0"/>
+              <a:t>See Current version of plots.</a:t>
+            </a:r>
             <a:endParaRPr lang="en-GB" dirty="0"/>
           </a:p>
         </p:txBody>

</xml_diff>